<commit_message>
rnn lstm done, visualize rnn done
</commit_message>
<xml_diff>
--- a/Szimpózium04017.pptx
+++ b/Szimpózium04017.pptx
@@ -219,7 +219,7 @@
           <a:p>
             <a:fld id="{E5B3A7D0-752F-4A72-AA46-C1316BEEC832}" type="datetimeFigureOut">
               <a:rPr lang="hu-HU" smtClean="0"/>
-              <a:t>2019. 04. 16.</a:t>
+              <a:t>2019. 04. 17.</a:t>
             </a:fld>
             <a:endParaRPr lang="hu-HU"/>
           </a:p>
@@ -1665,7 +1665,7 @@
             <a:fld id="{B61BEF0D-F0BB-DE4B-95CE-6DB70DBA9567}" type="datetimeFigureOut">
               <a:rPr lang="en-US" dirty="0"/>
               <a:pPr/>
-              <a:t>4/16/2019</a:t>
+              <a:t>4/17/2019</a:t>
             </a:fld>
             <a:endParaRPr lang="en-US" dirty="0"/>
           </a:p>
@@ -1958,7 +1958,7 @@
             <a:fld id="{B61BEF0D-F0BB-DE4B-95CE-6DB70DBA9567}" type="datetimeFigureOut">
               <a:rPr lang="en-US" dirty="0"/>
               <a:pPr/>
-              <a:t>4/16/2019</a:t>
+              <a:t>4/17/2019</a:t>
             </a:fld>
             <a:endParaRPr lang="en-US" dirty="0"/>
           </a:p>
@@ -2203,7 +2203,7 @@
             <a:fld id="{B61BEF0D-F0BB-DE4B-95CE-6DB70DBA9567}" type="datetimeFigureOut">
               <a:rPr lang="en-US" dirty="0"/>
               <a:pPr/>
-              <a:t>4/16/2019</a:t>
+              <a:t>4/17/2019</a:t>
             </a:fld>
             <a:endParaRPr lang="en-US" dirty="0"/>
           </a:p>
@@ -2740,7 +2740,7 @@
             <a:fld id="{B61BEF0D-F0BB-DE4B-95CE-6DB70DBA9567}" type="datetimeFigureOut">
               <a:rPr lang="en-US" dirty="0"/>
               <a:pPr/>
-              <a:t>4/16/2019</a:t>
+              <a:t>4/17/2019</a:t>
             </a:fld>
             <a:endParaRPr lang="en-US" dirty="0"/>
           </a:p>
@@ -2985,7 +2985,7 @@
             <a:fld id="{B61BEF0D-F0BB-DE4B-95CE-6DB70DBA9567}" type="datetimeFigureOut">
               <a:rPr lang="en-US" dirty="0"/>
               <a:pPr/>
-              <a:t>4/16/2019</a:t>
+              <a:t>4/17/2019</a:t>
             </a:fld>
             <a:endParaRPr lang="en-US" dirty="0"/>
           </a:p>
@@ -3514,7 +3514,7 @@
             <a:fld id="{B61BEF0D-F0BB-DE4B-95CE-6DB70DBA9567}" type="datetimeFigureOut">
               <a:rPr lang="en-US" dirty="0"/>
               <a:pPr/>
-              <a:t>4/16/2019</a:t>
+              <a:t>4/17/2019</a:t>
             </a:fld>
             <a:endParaRPr lang="en-US" dirty="0"/>
           </a:p>
@@ -3808,7 +3808,7 @@
             <a:fld id="{B61BEF0D-F0BB-DE4B-95CE-6DB70DBA9567}" type="datetimeFigureOut">
               <a:rPr lang="en-US" dirty="0"/>
               <a:pPr/>
-              <a:t>4/16/2019</a:t>
+              <a:t>4/17/2019</a:t>
             </a:fld>
             <a:endParaRPr lang="en-US" dirty="0"/>
           </a:p>
@@ -3979,7 +3979,7 @@
             <a:fld id="{B61BEF0D-F0BB-DE4B-95CE-6DB70DBA9567}" type="datetimeFigureOut">
               <a:rPr lang="en-US" dirty="0"/>
               <a:pPr/>
-              <a:t>4/16/2019</a:t>
+              <a:t>4/17/2019</a:t>
             </a:fld>
             <a:endParaRPr lang="en-US" dirty="0"/>
           </a:p>
@@ -4156,7 +4156,7 @@
             <a:fld id="{B61BEF0D-F0BB-DE4B-95CE-6DB70DBA9567}" type="datetimeFigureOut">
               <a:rPr lang="en-US" dirty="0"/>
               <a:pPr/>
-              <a:t>4/16/2019</a:t>
+              <a:t>4/17/2019</a:t>
             </a:fld>
             <a:endParaRPr lang="en-US" dirty="0"/>
           </a:p>
@@ -4323,7 +4323,7 @@
             <a:fld id="{B61BEF0D-F0BB-DE4B-95CE-6DB70DBA9567}" type="datetimeFigureOut">
               <a:rPr lang="en-US" dirty="0"/>
               <a:pPr/>
-              <a:t>4/16/2019</a:t>
+              <a:t>4/17/2019</a:t>
             </a:fld>
             <a:endParaRPr lang="en-US" dirty="0"/>
           </a:p>
@@ -4571,7 +4571,7 @@
             <a:fld id="{B61BEF0D-F0BB-DE4B-95CE-6DB70DBA9567}" type="datetimeFigureOut">
               <a:rPr lang="en-US" dirty="0"/>
               <a:pPr/>
-              <a:t>4/16/2019</a:t>
+              <a:t>4/17/2019</a:t>
             </a:fld>
             <a:endParaRPr lang="en-US" dirty="0"/>
           </a:p>
@@ -4865,7 +4865,7 @@
             <a:fld id="{B61BEF0D-F0BB-DE4B-95CE-6DB70DBA9567}" type="datetimeFigureOut">
               <a:rPr lang="en-US" dirty="0"/>
               <a:pPr/>
-              <a:t>4/16/2019</a:t>
+              <a:t>4/17/2019</a:t>
             </a:fld>
             <a:endParaRPr lang="en-US" dirty="0"/>
           </a:p>
@@ -5304,7 +5304,7 @@
             <a:fld id="{B61BEF0D-F0BB-DE4B-95CE-6DB70DBA9567}" type="datetimeFigureOut">
               <a:rPr lang="en-US" dirty="0"/>
               <a:pPr/>
-              <a:t>4/16/2019</a:t>
+              <a:t>4/17/2019</a:t>
             </a:fld>
             <a:endParaRPr lang="en-US" dirty="0"/>
           </a:p>
@@ -5419,7 +5419,7 @@
             <a:fld id="{B61BEF0D-F0BB-DE4B-95CE-6DB70DBA9567}" type="datetimeFigureOut">
               <a:rPr lang="en-US" dirty="0"/>
               <a:pPr/>
-              <a:t>4/16/2019</a:t>
+              <a:t>4/17/2019</a:t>
             </a:fld>
             <a:endParaRPr lang="en-US" dirty="0"/>
           </a:p>
@@ -5511,7 +5511,7 @@
             <a:fld id="{B61BEF0D-F0BB-DE4B-95CE-6DB70DBA9567}" type="datetimeFigureOut">
               <a:rPr lang="en-US" dirty="0"/>
               <a:pPr/>
-              <a:t>4/16/2019</a:t>
+              <a:t>4/17/2019</a:t>
             </a:fld>
             <a:endParaRPr lang="en-US" dirty="0"/>
           </a:p>
@@ -5791,7 +5791,7 @@
             <a:fld id="{B61BEF0D-F0BB-DE4B-95CE-6DB70DBA9567}" type="datetimeFigureOut">
               <a:rPr lang="en-US" dirty="0"/>
               <a:pPr/>
-              <a:t>4/16/2019</a:t>
+              <a:t>4/17/2019</a:t>
             </a:fld>
             <a:endParaRPr lang="en-US" dirty="0"/>
           </a:p>
@@ -6079,7 +6079,7 @@
             <a:fld id="{B61BEF0D-F0BB-DE4B-95CE-6DB70DBA9567}" type="datetimeFigureOut">
               <a:rPr lang="en-US" dirty="0"/>
               <a:pPr/>
-              <a:t>4/16/2019</a:t>
+              <a:t>4/17/2019</a:t>
             </a:fld>
             <a:endParaRPr lang="en-US" dirty="0"/>
           </a:p>
@@ -6606,7 +6606,7 @@
             <a:fld id="{B61BEF0D-F0BB-DE4B-95CE-6DB70DBA9567}" type="datetimeFigureOut">
               <a:rPr lang="en-US" dirty="0"/>
               <a:pPr/>
-              <a:t>4/16/2019</a:t>
+              <a:t>4/17/2019</a:t>
             </a:fld>
             <a:endParaRPr lang="en-US" dirty="0"/>
           </a:p>
@@ -7303,13 +7303,13 @@
           <a:p>
             <a:r>
               <a:rPr lang="hu-HU" dirty="0"/>
-              <a:t>Tanítási módszer megvizsgálása</a:t>
+              <a:t>Tanítási módszer megvizsgálása (megint kétféle hibafüggvény)</a:t>
             </a:r>
           </a:p>
           <a:p>
             <a:r>
               <a:rPr lang="hu-HU" dirty="0"/>
-              <a:t>RNN tanítása</a:t>
+              <a:t>RNN tanítása, különböző megközelítések kipróbálása</a:t>
             </a:r>
           </a:p>
           <a:p>
@@ -8168,6 +8168,41 @@
           <a:p>
             <a:r>
               <a:rPr lang="hu-HU" dirty="0"/>
+              <a:t>Input </a:t>
+            </a:r>
+            <a:r>
+              <a:rPr lang="hu-HU" dirty="0" err="1"/>
+              <a:t>gate</a:t>
+            </a:r>
+            <a:r>
+              <a:rPr lang="hu-HU" dirty="0"/>
+              <a:t>, output </a:t>
+            </a:r>
+            <a:r>
+              <a:rPr lang="hu-HU" dirty="0" err="1"/>
+              <a:t>gate</a:t>
+            </a:r>
+            <a:r>
+              <a:rPr lang="hu-HU" dirty="0"/>
+              <a:t>, </a:t>
+            </a:r>
+            <a:r>
+              <a:rPr lang="hu-HU" dirty="0" err="1"/>
+              <a:t>forget</a:t>
+            </a:r>
+            <a:r>
+              <a:rPr lang="hu-HU" dirty="0"/>
+              <a:t> </a:t>
+            </a:r>
+            <a:r>
+              <a:rPr lang="hu-HU" dirty="0" err="1"/>
+              <a:t>gate</a:t>
+            </a:r>
+            <a:endParaRPr lang="hu-HU" dirty="0"/>
+          </a:p>
+          <a:p>
+            <a:r>
+              <a:rPr lang="hu-HU" dirty="0"/>
               <a:t>Időben távoli eseményeket is képes kezelni</a:t>
             </a:r>
           </a:p>
@@ -8176,41 +8211,6 @@
               <a:rPr lang="hu-HU" dirty="0"/>
               <a:t>Megoldást ad az elenyésző gradiens problémájára</a:t>
             </a:r>
-          </a:p>
-          <a:p>
-            <a:r>
-              <a:rPr lang="hu-HU" dirty="0"/>
-              <a:t>Input </a:t>
-            </a:r>
-            <a:r>
-              <a:rPr lang="hu-HU" dirty="0" err="1"/>
-              <a:t>gate</a:t>
-            </a:r>
-            <a:r>
-              <a:rPr lang="hu-HU" dirty="0"/>
-              <a:t>, output </a:t>
-            </a:r>
-            <a:r>
-              <a:rPr lang="hu-HU" dirty="0" err="1"/>
-              <a:t>gate</a:t>
-            </a:r>
-            <a:r>
-              <a:rPr lang="hu-HU" dirty="0"/>
-              <a:t>, </a:t>
-            </a:r>
-            <a:r>
-              <a:rPr lang="hu-HU" dirty="0" err="1"/>
-              <a:t>forget</a:t>
-            </a:r>
-            <a:r>
-              <a:rPr lang="hu-HU" dirty="0"/>
-              <a:t> </a:t>
-            </a:r>
-            <a:r>
-              <a:rPr lang="hu-HU" dirty="0" err="1"/>
-              <a:t>gate</a:t>
-            </a:r>
-            <a:endParaRPr lang="en-US" dirty="0"/>
           </a:p>
         </p:txBody>
       </p:sp>

</xml_diff>